<commit_message>
Tom 13 mit Bild
</commit_message>
<xml_diff>
--- a/training-cards/music moves/Tomatoes (TOM)/ger/apprentice/ger_TOM_13_Spiele_mit_der_Zeit_MM_A.pptx
+++ b/training-cards/music moves/Tomatoes (TOM)/ger/apprentice/ger_TOM_13_Spiele_mit_der_Zeit_MM_A.pptx
@@ -1996,6 +1996,35 @@
           </a:p>
         </p:txBody>
       </p:sp>
+      <p:pic>
+        <p:nvPicPr>
+          <p:cNvPr id="3" name="Bild 2"/>
+          <p:cNvPicPr>
+            <a:picLocks noChangeAspect="1"/>
+          </p:cNvPicPr>
+          <p:nvPr/>
+        </p:nvPicPr>
+        <p:blipFill rotWithShape="1">
+          <a:blip r:embed="rId2">
+            <a:extLst>
+              <a:ext uri="{28A0092B-C50C-407E-A947-70E740481C1C}">
+                <a14:useLocalDpi xmlns:a14="http://schemas.microsoft.com/office/drawing/2010/main" val="0"/>
+              </a:ext>
+            </a:extLst>
+          </a:blip>
+          <a:srcRect l="25693" t="13821" r="42188"/>
+          <a:stretch/>
+        </p:blipFill>
+        <p:spPr>
+          <a:xfrm>
+            <a:off x="5510914" y="3377140"/>
+            <a:ext cx="927203" cy="1399340"/>
+          </a:xfrm>
+          <a:prstGeom prst="rect">
+            <a:avLst/>
+          </a:prstGeom>
+        </p:spPr>
+      </p:pic>
     </p:spTree>
     <p:extLst>
       <p:ext uri="{BB962C8B-B14F-4D97-AF65-F5344CB8AC3E}">
@@ -2135,11 +2164,11 @@
               <a:t>Halte ich meine </a:t>
             </a:r>
             <a:r>
-              <a:rPr lang="de-DE" sz="1100" smtClean="0"/>
+              <a:rPr lang="de-DE" sz="1100" dirty="0" smtClean="0"/>
               <a:t>Zeitfenster exakt</a:t>
             </a:r>
             <a:r>
-              <a:rPr lang="de-DE" sz="1100" smtClean="0"/>
+              <a:rPr lang="de-DE" sz="1100" dirty="0" smtClean="0"/>
               <a:t> </a:t>
             </a:r>
             <a:r>

</xml_diff>

<commit_message>
TOM 13 Spiele mit der Zeit
Für Promotion überarbeitet
</commit_message>
<xml_diff>
--- a/training-cards/music moves/Tomatoes (TOM)/ger/apprentice/ger_TOM_13_Spiele_mit_der_Zeit_MM_A.pptx
+++ b/training-cards/music moves/Tomatoes (TOM)/ger/apprentice/ger_TOM_13_Spiele_mit_der_Zeit_MM_A.pptx
@@ -166,7 +166,7 @@
           </a:lstStyle>
           <a:p>
             <a:r>
-              <a:rPr lang="de-DE" smtClean="0"/>
+              <a:rPr lang="de-DE"/>
               <a:t>Mastertitelformat bearbeiten</a:t>
             </a:r>
             <a:endParaRPr lang="de-DE" dirty="0"/>
@@ -287,7 +287,7 @@
           </a:lstStyle>
           <a:p>
             <a:r>
-              <a:rPr lang="de-DE" smtClean="0"/>
+              <a:rPr lang="de-DE"/>
               <a:t>Master-Untertitelformat bearbeiten</a:t>
             </a:r>
             <a:endParaRPr lang="de-DE" dirty="0"/>
@@ -321,35 +321,35 @@
           <a:p>
             <a:pPr lvl="0"/>
             <a:r>
-              <a:rPr lang="de-DE" smtClean="0"/>
+              <a:rPr lang="de-DE"/>
               <a:t>Mastertextformat bearbeiten</a:t>
             </a:r>
           </a:p>
           <a:p>
             <a:pPr lvl="1"/>
             <a:r>
-              <a:rPr lang="de-DE" smtClean="0"/>
+              <a:rPr lang="de-DE"/>
               <a:t>Zweite Ebene</a:t>
             </a:r>
           </a:p>
           <a:p>
             <a:pPr lvl="2"/>
             <a:r>
-              <a:rPr lang="de-DE" smtClean="0"/>
+              <a:rPr lang="de-DE"/>
               <a:t>Dritte Ebene</a:t>
             </a:r>
           </a:p>
           <a:p>
             <a:pPr lvl="3"/>
             <a:r>
-              <a:rPr lang="de-DE" smtClean="0"/>
+              <a:rPr lang="de-DE"/>
               <a:t>Vierte Ebene</a:t>
             </a:r>
           </a:p>
           <a:p>
             <a:pPr lvl="4"/>
             <a:r>
-              <a:rPr lang="de-DE" smtClean="0"/>
+              <a:rPr lang="de-DE"/>
               <a:t>Fünfte Ebene</a:t>
             </a:r>
             <a:endParaRPr lang="de-DE" dirty="0"/>
@@ -397,7 +397,7 @@
           <a:p>
             <a:pPr algn="l"/>
             <a:r>
-              <a:rPr lang="de-DE" sz="1000" dirty="0" smtClean="0">
+              <a:rPr lang="de-DE" sz="1000" dirty="0">
                 <a:solidFill>
                   <a:srgbClr val="5D5E5F"/>
                 </a:solidFill>
@@ -407,7 +407,7 @@
               <a:t>REGINA</a:t>
             </a:r>
             <a:r>
-              <a:rPr lang="de-DE" sz="1000" baseline="0" dirty="0" smtClean="0">
+              <a:rPr lang="de-DE" sz="1000" baseline="0" dirty="0">
                 <a:solidFill>
                   <a:srgbClr val="5D5E5F"/>
                 </a:solidFill>
@@ -417,7 +417,7 @@
               <a:t> BRANDHUBER</a:t>
             </a:r>
             <a:r>
-              <a:rPr lang="de-DE" sz="1000" dirty="0" smtClean="0">
+              <a:rPr lang="de-DE" sz="1000" dirty="0">
                 <a:solidFill>
                   <a:srgbClr val="5D5E5F"/>
                 </a:solidFill>
@@ -426,13 +426,6 @@
               </a:rPr>
               <a:t> </a:t>
             </a:r>
-            <a:endParaRPr lang="de-DE" sz="1000" dirty="0">
-              <a:solidFill>
-                <a:srgbClr val="5D5E5F"/>
-              </a:solidFill>
-              <a:latin typeface="Avenir Book"/>
-              <a:cs typeface="Avenir Book"/>
-            </a:endParaRPr>
           </a:p>
         </p:txBody>
       </p:sp>
@@ -545,35 +538,35 @@
           <a:p>
             <a:pPr lvl="0"/>
             <a:r>
-              <a:rPr lang="de-DE" smtClean="0"/>
+              <a:rPr lang="de-DE"/>
               <a:t>Mastertextformat bearbeiten</a:t>
             </a:r>
           </a:p>
           <a:p>
             <a:pPr lvl="1"/>
             <a:r>
-              <a:rPr lang="de-DE" smtClean="0"/>
+              <a:rPr lang="de-DE"/>
               <a:t>Zweite Ebene</a:t>
             </a:r>
           </a:p>
           <a:p>
             <a:pPr lvl="2"/>
             <a:r>
-              <a:rPr lang="de-DE" smtClean="0"/>
+              <a:rPr lang="de-DE"/>
               <a:t>Dritte Ebene</a:t>
             </a:r>
           </a:p>
           <a:p>
             <a:pPr lvl="3"/>
             <a:r>
-              <a:rPr lang="de-DE" smtClean="0"/>
+              <a:rPr lang="de-DE"/>
               <a:t>Vierte Ebene</a:t>
             </a:r>
           </a:p>
           <a:p>
             <a:pPr lvl="4"/>
             <a:r>
-              <a:rPr lang="de-DE" smtClean="0"/>
+              <a:rPr lang="de-DE"/>
               <a:t>Fünfte Ebene</a:t>
             </a:r>
             <a:endParaRPr lang="de-DE" dirty="0"/>
@@ -603,7 +596,7 @@
           <a:lstStyle/>
           <a:p>
             <a:r>
-              <a:rPr lang="de-DE" sz="2400" dirty="0" smtClean="0">
+              <a:rPr lang="de-DE" sz="2400" dirty="0">
                 <a:solidFill>
                   <a:srgbClr val="7E006B"/>
                 </a:solidFill>
@@ -613,7 +606,7 @@
               <a:t>TR	AININGS</a:t>
             </a:r>
             <a:r>
-              <a:rPr lang="de-DE" sz="2400" dirty="0" smtClean="0">
+              <a:rPr lang="de-DE" sz="2400" dirty="0">
                 <a:solidFill>
                   <a:srgbClr val="7E006B"/>
                 </a:solidFill>
@@ -708,10 +701,9 @@
           <a:lstStyle/>
           <a:p>
             <a:r>
-              <a:rPr lang="de-DE" smtClean="0"/>
+              <a:rPr lang="de-DE"/>
               <a:t>Mastertitelformat bearbeiten</a:t>
             </a:r>
-            <a:endParaRPr lang="de-DE"/>
           </a:p>
         </p:txBody>
       </p:sp>
@@ -732,7 +724,7 @@
           <a:p>
             <a:fld id="{FF5B2BAF-DF38-0A48-A798-0C06E514FD52}" type="datetimeFigureOut">
               <a:rPr lang="de-DE" smtClean="0"/>
-              <a:t>16.03.16</a:t>
+              <a:t>12.09.18</a:t>
             </a:fld>
             <a:endParaRPr lang="de-DE" dirty="0"/>
           </a:p>
@@ -843,10 +835,9 @@
           <a:p>
             <a:pPr marL="0" lvl="0" algn="l"/>
             <a:r>
-              <a:rPr lang="de-DE" dirty="0" smtClean="0"/>
+              <a:rPr lang="de-DE" dirty="0"/>
               <a:t>Überschrift bearbeiten </a:t>
             </a:r>
-            <a:endParaRPr lang="de-DE" dirty="0"/>
           </a:p>
         </p:txBody>
       </p:sp>
@@ -877,38 +868,37 @@
           <a:p>
             <a:pPr lvl="0"/>
             <a:r>
-              <a:rPr lang="de-DE" dirty="0" smtClean="0"/>
+              <a:rPr lang="de-DE" dirty="0"/>
               <a:t>Mastertextformat bearbeiten</a:t>
             </a:r>
           </a:p>
           <a:p>
             <a:pPr lvl="1"/>
             <a:r>
-              <a:rPr lang="de-DE" dirty="0" smtClean="0"/>
+              <a:rPr lang="de-DE" dirty="0"/>
               <a:t>Zweite Ebene</a:t>
             </a:r>
           </a:p>
           <a:p>
             <a:pPr lvl="2"/>
             <a:r>
-              <a:rPr lang="de-DE" dirty="0" smtClean="0"/>
+              <a:rPr lang="de-DE" dirty="0"/>
               <a:t>Dritte Ebene</a:t>
             </a:r>
           </a:p>
           <a:p>
             <a:pPr lvl="3"/>
             <a:r>
-              <a:rPr lang="de-DE" dirty="0" smtClean="0"/>
+              <a:rPr lang="de-DE" dirty="0"/>
               <a:t>Vierte Ebene</a:t>
             </a:r>
           </a:p>
           <a:p>
             <a:pPr lvl="4"/>
             <a:r>
-              <a:rPr lang="de-DE" dirty="0" smtClean="0"/>
+              <a:rPr lang="de-DE" dirty="0"/>
               <a:t>Fünfte Ebene</a:t>
             </a:r>
-            <a:endParaRPr lang="de-DE" dirty="0"/>
           </a:p>
         </p:txBody>
       </p:sp>
@@ -947,7 +937,7 @@
           <a:p>
             <a:fld id="{FF5B2BAF-DF38-0A48-A798-0C06E514FD52}" type="datetimeFigureOut">
               <a:rPr lang="de-DE" smtClean="0"/>
-              <a:t>16.03.16</a:t>
+              <a:t>12.09.18</a:t>
             </a:fld>
             <a:endParaRPr lang="de-DE" dirty="0"/>
           </a:p>
@@ -1181,7 +1171,7 @@
           <a:lstStyle/>
           <a:p>
             <a:r>
-              <a:rPr lang="de-DE" sz="1050" b="1" dirty="0" smtClean="0">
+              <a:rPr lang="de-DE" sz="1050" b="1" dirty="0">
                 <a:solidFill>
                   <a:schemeClr val="bg1"/>
                 </a:solidFill>
@@ -1191,7 +1181,7 @@
               <a:t>TRAININGSKARTE</a:t>
             </a:r>
             <a:r>
-              <a:rPr lang="de-DE" sz="1050" dirty="0" smtClean="0">
+              <a:rPr lang="de-DE" sz="1050" dirty="0">
                 <a:solidFill>
                   <a:schemeClr val="bg1"/>
                 </a:solidFill>
@@ -1201,7 +1191,7 @@
               <a:t> </a:t>
             </a:r>
             <a:r>
-              <a:rPr lang="de-DE" sz="1050" b="1" dirty="0" smtClean="0">
+              <a:rPr lang="de-DE" sz="1050" b="1" dirty="0">
                 <a:solidFill>
                   <a:schemeClr val="bg1"/>
                 </a:solidFill>
@@ -1210,13 +1200,6 @@
               </a:rPr>
               <a:t>TOM 13</a:t>
             </a:r>
-            <a:endParaRPr lang="de-DE" sz="1050" b="1" dirty="0">
-              <a:solidFill>
-                <a:schemeClr val="bg1"/>
-              </a:solidFill>
-              <a:latin typeface="Avenir Heavy"/>
-              <a:cs typeface="Avenir Heavy"/>
-            </a:endParaRPr>
           </a:p>
         </p:txBody>
       </p:sp>
@@ -1599,20 +1582,16 @@
           <a:lstStyle/>
           <a:p>
             <a:r>
-              <a:rPr lang="de-DE" dirty="0" smtClean="0"/>
+              <a:rPr lang="de-DE" dirty="0"/>
               <a:t>SPIELE </a:t>
             </a:r>
             <a:r>
-              <a:rPr lang="de-DE" dirty="0" smtClean="0">
+              <a:rPr lang="de-DE" dirty="0">
                 <a:latin typeface="Avenir Book"/>
                 <a:cs typeface="Avenir Book"/>
               </a:rPr>
               <a:t>MIT DER ZEIT</a:t>
             </a:r>
-            <a:endParaRPr lang="de-DE" dirty="0">
-              <a:latin typeface="Avenir Book"/>
-              <a:cs typeface="Avenir Book"/>
-            </a:endParaRPr>
           </a:p>
         </p:txBody>
       </p:sp>
@@ -1639,26 +1618,9 @@
               </a:lnSpc>
             </a:pPr>
             <a:r>
-              <a:rPr lang="de-DE" sz="1100" dirty="0" smtClean="0"/>
-              <a:t>Innerhalb</a:t>
-            </a:r>
-            <a:r>
-              <a:rPr lang="de-DE" sz="1100" dirty="0" smtClean="0"/>
-              <a:t> eines Zeitfensters </a:t>
-            </a:r>
-            <a:r>
               <a:rPr lang="de-DE" sz="1100" dirty="0"/>
-              <a:t>von 25 min </a:t>
-            </a:r>
-            <a:r>
-              <a:rPr lang="de-DE" sz="1100" dirty="0" smtClean="0"/>
-              <a:t>zu arbeiten, ist </a:t>
-            </a:r>
-            <a:r>
-              <a:rPr lang="de-DE" sz="1100" dirty="0" smtClean="0"/>
-              <a:t>eine Möglichkeit neben vielen weiteren, die auch gut funktionieren können.</a:t>
-            </a:r>
-            <a:endParaRPr lang="de-DE" sz="1100" dirty="0"/>
+              <a:t>Innerhalb eines Zeitfensters von 25 min zu arbeiten, ist eine Möglichkeit neben vielen weiteren, die auch gut funktionieren können.</a:t>
+            </a:r>
           </a:p>
           <a:p>
             <a:pPr>
@@ -1668,33 +1630,8 @@
             </a:pPr>
             <a:r>
               <a:rPr lang="de-DE" sz="1100" dirty="0"/>
-              <a:t>Um herauszufinden, </a:t>
-            </a:r>
-            <a:r>
-              <a:rPr lang="de-DE" sz="1100" dirty="0" smtClean="0"/>
-              <a:t>welches für Dich am besten </a:t>
-            </a:r>
-            <a:r>
-              <a:rPr lang="de-DE" sz="1100" dirty="0"/>
-              <a:t>passt, kannst Du unterschiedliche </a:t>
-            </a:r>
-            <a:r>
-              <a:rPr lang="de-DE" sz="1100" dirty="0" smtClean="0"/>
-              <a:t>Zeitfenster</a:t>
-            </a:r>
-            <a:r>
-              <a:rPr lang="de-DE" sz="1100" dirty="0" smtClean="0"/>
-              <a:t> </a:t>
-            </a:r>
-            <a:r>
-              <a:rPr lang="de-DE" sz="1100" dirty="0"/>
-              <a:t>ausprobieren</a:t>
-            </a:r>
-            <a:r>
-              <a:rPr lang="de-DE" sz="1100" dirty="0" smtClean="0"/>
-              <a:t>.</a:t>
-            </a:r>
-            <a:endParaRPr lang="de-DE" sz="1100" dirty="0"/>
+              <a:t>Um herauszufinden, welches für Dich am besten passt, kannst Du unterschiedliche Zeitfenster ausprobieren.</a:t>
+            </a:r>
           </a:p>
           <a:p>
             <a:pPr>
@@ -1704,15 +1641,7 @@
             </a:pPr>
             <a:r>
               <a:rPr lang="de-DE" sz="1100" dirty="0"/>
-              <a:t>Wenn Du </a:t>
-            </a:r>
-            <a:r>
-              <a:rPr lang="de-DE" sz="1100" dirty="0" smtClean="0"/>
-              <a:t>damit experimentierst</a:t>
-            </a:r>
-            <a:r>
-              <a:rPr lang="de-DE" sz="1100" dirty="0"/>
-              <a:t>, ist es wichtig, Klarheit beizubehalten. Du kannst Dich sonst schnell in Beliebigkeit verlieren. </a:t>
+              <a:t>Wenn Du damit experimentierst, ist es wichtig, Klarheit beizubehalten. Du kannst Dich sonst schnell in Beliebigkeit verlieren. </a:t>
             </a:r>
           </a:p>
           <a:p>
@@ -1723,49 +1652,16 @@
             </a:pPr>
             <a:r>
               <a:rPr lang="de-DE" sz="1100" dirty="0"/>
-              <a:t>Vor Beginn </a:t>
-            </a:r>
-            <a:r>
-              <a:rPr lang="de-DE" sz="1100" dirty="0" smtClean="0"/>
-              <a:t>Deiner</a:t>
-            </a:r>
-            <a:r>
-              <a:rPr lang="de-DE" sz="1100" dirty="0" smtClean="0"/>
-              <a:t> „Tomate“</a:t>
-            </a:r>
-            <a:r>
-              <a:rPr lang="de-DE" sz="1100" baseline="30000" dirty="0" smtClean="0"/>
+              <a:t>Vor Beginn Deiner Pomodoro</a:t>
+            </a:r>
+            <a:r>
+              <a:rPr lang="de-DE" sz="1100" baseline="30000" dirty="0"/>
               <a:t>1</a:t>
             </a:r>
             <a:r>
-              <a:rPr lang="de-DE" sz="1100" dirty="0" smtClean="0"/>
-              <a:t> </a:t>
-            </a:r>
-            <a:r>
               <a:rPr lang="de-DE" sz="1100" dirty="0"/>
-              <a:t>legst Du fest, wie lange sie sein soll. </a:t>
-            </a:r>
-            <a:r>
-              <a:rPr lang="de-DE" sz="1100" dirty="0" smtClean="0"/>
-              <a:t>Die Länge </a:t>
-            </a:r>
-            <a:r>
-              <a:rPr lang="de-DE" sz="1100" dirty="0"/>
-              <a:t>über mehrere Tomaten konstant zu halten, hilft Dir ein Gefühl </a:t>
-            </a:r>
-            <a:r>
-              <a:rPr lang="de-DE" sz="1100" dirty="0" smtClean="0"/>
-              <a:t>dafür </a:t>
-            </a:r>
-            <a:r>
-              <a:rPr lang="de-DE" sz="1100" dirty="0"/>
-              <a:t>zu </a:t>
-            </a:r>
-            <a:r>
-              <a:rPr lang="de-DE" sz="1100" dirty="0" smtClean="0"/>
-              <a:t>entwickeln.</a:t>
-            </a:r>
-            <a:endParaRPr lang="de-DE" sz="1100" dirty="0"/>
+              <a:t> legst Du fest, wie lange sie sein soll. Die Länge über mehrere Tomaten konstant zu halten, hilft Dir ein Gefühl dafür zu entwickeln.</a:t>
+            </a:r>
           </a:p>
           <a:p>
             <a:pPr>
@@ -1774,68 +1670,39 @@
               </a:lnSpc>
             </a:pPr>
             <a:r>
-              <a:rPr lang="de-DE" sz="1100" dirty="0" smtClean="0"/>
-              <a:t>Beispiele</a:t>
-            </a:r>
-            <a:r>
-              <a:rPr lang="de-DE" sz="1100" dirty="0" smtClean="0"/>
+              <a:rPr lang="de-DE" sz="1100" dirty="0"/>
+              <a:t>Francesco </a:t>
+            </a:r>
+            <a:r>
+              <a:rPr lang="de-DE" sz="1100" dirty="0" err="1"/>
+              <a:t>Cirillo</a:t>
+            </a:r>
+            <a:r>
+              <a:rPr lang="de-DE" sz="1100" dirty="0"/>
+              <a:t>, der Erfinder der </a:t>
+            </a:r>
+            <a:r>
+              <a:rPr lang="de-DE" sz="1100" dirty="0" err="1"/>
+              <a:t>Pomodoro</a:t>
+            </a:r>
+            <a:r>
+              <a:rPr lang="de-DE" sz="1100" dirty="0"/>
+              <a:t> Technik </a:t>
+            </a:r>
+            <a:r>
+              <a:rPr lang="de-DE" sz="1100" dirty="0" err="1"/>
+              <a:t>empfielt</a:t>
+            </a:r>
+            <a:r>
+              <a:rPr lang="de-DE" sz="1100" dirty="0"/>
               <a:t> </a:t>
             </a:r>
-            <a:r>
+            <a:br>
               <a:rPr lang="de-DE" sz="1100" dirty="0"/>
-              <a:t>für Tomaten wären:</a:t>
-            </a:r>
-          </a:p>
-          <a:p>
-            <a:pPr lvl="1">
-              <a:lnSpc>
-                <a:spcPct val="120000"/>
-              </a:lnSpc>
-            </a:pPr>
+            </a:br>
             <a:r>
               <a:rPr lang="de-DE" sz="1100" dirty="0"/>
-              <a:t>5 min </a:t>
-            </a:r>
-            <a:r>
-              <a:rPr lang="de-DE" sz="1100" dirty="0" smtClean="0"/>
-              <a:t>Tomate</a:t>
-            </a:r>
-          </a:p>
-          <a:p>
-            <a:pPr lvl="1">
-              <a:lnSpc>
-                <a:spcPct val="120000"/>
-              </a:lnSpc>
-            </a:pPr>
-            <a:r>
-              <a:rPr lang="de-DE" sz="1100" dirty="0" smtClean="0"/>
-              <a:t>15 </a:t>
-            </a:r>
-            <a:r>
-              <a:rPr lang="de-DE" sz="1100" dirty="0"/>
-              <a:t>min Tomate</a:t>
-            </a:r>
-          </a:p>
-          <a:p>
-            <a:pPr lvl="1">
-              <a:lnSpc>
-                <a:spcPct val="120000"/>
-              </a:lnSpc>
-            </a:pPr>
-            <a:r>
-              <a:rPr lang="de-DE" sz="1100" dirty="0"/>
-              <a:t>20 min Tomate</a:t>
-            </a:r>
-          </a:p>
-          <a:p>
-            <a:pPr lvl="1">
-              <a:lnSpc>
-                <a:spcPct val="120000"/>
-              </a:lnSpc>
-            </a:pPr>
-            <a:r>
-              <a:rPr lang="de-DE" sz="1100" dirty="0"/>
-              <a:t>45 min Tomate</a:t>
+              <a:t>Einheiten von 20-40 Minuten.</a:t>
             </a:r>
             <a:endParaRPr lang="de-DE" dirty="0"/>
           </a:p>
@@ -1957,7 +1824,7 @@
           </a:lstStyle>
           <a:p>
             <a:r>
-              <a:rPr lang="de-DE" sz="900" baseline="30000" dirty="0" smtClean="0">
+              <a:rPr lang="de-DE" sz="900" baseline="30000" dirty="0">
                 <a:solidFill>
                   <a:schemeClr val="bg1">
                     <a:lumMod val="65000"/>
@@ -1967,7 +1834,7 @@
               <a:t>1</a:t>
             </a:r>
             <a:r>
-              <a:rPr lang="de-DE" sz="900" dirty="0" smtClean="0">
+              <a:rPr lang="de-DE" sz="900" dirty="0">
                 <a:solidFill>
                   <a:schemeClr val="bg1">
                     <a:lumMod val="65000"/>
@@ -1977,7 +1844,7 @@
               <a:t>  </a:t>
             </a:r>
             <a:r>
-              <a:rPr lang="de-DE" sz="900" dirty="0" err="1" smtClean="0">
+              <a:rPr lang="de-DE" sz="900" dirty="0" err="1">
                 <a:solidFill>
                   <a:schemeClr val="bg1">
                     <a:lumMod val="65000"/>
@@ -2074,73 +1941,49 @@
           <a:p>
             <a:r>
               <a:rPr lang="de-DE" sz="1100" dirty="0"/>
-              <a:t>Trainiere in 2 Wochen 3 Phasen, in denen Du </a:t>
-            </a:r>
-            <a:r>
-              <a:rPr lang="de-DE" sz="1100" dirty="0" smtClean="0"/>
-              <a:t>Deine Zeitfenster </a:t>
-            </a:r>
+              <a:t>Trainiere in 2 Wochen 3 Phasen, in denen Du Deine Zeitfenster änderst.</a:t>
+            </a:r>
+          </a:p>
+          <a:p>
             <a:r>
               <a:rPr lang="de-DE" sz="1100" dirty="0"/>
-              <a:t>änderst.</a:t>
-            </a:r>
-          </a:p>
-          <a:p>
+              <a:t>Jede Phase sollte über 2 - 4 Tage andauern, an denen Du </a:t>
+            </a:r>
+            <a:r>
+              <a:rPr lang="de-DE" sz="1100" dirty="0" err="1"/>
+              <a:t>Pomodoros</a:t>
+            </a:r>
             <a:r>
               <a:rPr lang="de-DE" sz="1100" dirty="0"/>
-              <a:t>Jede Phase sollte über 2 - 4 </a:t>
-            </a:r>
-            <a:r>
-              <a:rPr lang="de-DE" sz="1100" dirty="0" smtClean="0"/>
-              <a:t>Tage </a:t>
-            </a:r>
+              <a:t> machst. Innerhalb dieser Zeit änderst Du ihre Länge nicht.</a:t>
+            </a:r>
+          </a:p>
+          <a:p>
             <a:r>
               <a:rPr lang="de-DE" sz="1100" dirty="0"/>
-              <a:t>gehen, an denen Du Tomaten machst. Innerhalb dieser Zeit änderst Du die </a:t>
-            </a:r>
-            <a:r>
-              <a:rPr lang="de-DE" sz="1100" dirty="0" smtClean="0"/>
-              <a:t>Länger der Zeitscheiben</a:t>
-            </a:r>
-            <a:r>
-              <a:rPr lang="de-DE" sz="1100" dirty="0" smtClean="0"/>
-              <a:t> </a:t>
+              <a:t>Mache in einer Phase mindestens 3 </a:t>
+            </a:r>
+            <a:r>
+              <a:rPr lang="de-DE" sz="1100" dirty="0" err="1"/>
+              <a:t>Pomodoros</a:t>
             </a:r>
             <a:r>
               <a:rPr lang="de-DE" sz="1100" dirty="0"/>
-              <a:t>nicht.</a:t>
+              <a:t> mit gleicher Länge, also insgesamt 9.</a:t>
             </a:r>
           </a:p>
           <a:p>
             <a:r>
               <a:rPr lang="de-DE" sz="1100" dirty="0"/>
-              <a:t>Mache in einer Phase </a:t>
-            </a:r>
-            <a:r>
-              <a:rPr lang="de-DE" sz="1100" dirty="0" smtClean="0"/>
-              <a:t>mindestens</a:t>
+              <a:t>Dokumentiere jede </a:t>
+            </a:r>
+            <a:r>
+              <a:rPr lang="de-DE" sz="1100" dirty="0" err="1"/>
+              <a:t>Pomodoro</a:t>
             </a:r>
             <a:r>
               <a:rPr lang="de-DE" sz="1100" dirty="0"/>
-              <a:t> 3 Tomaten mit gleicher Länge, also insgesamt 9 Tomaten</a:t>
-            </a:r>
-            <a:r>
-              <a:rPr lang="de-DE" sz="1100" dirty="0" smtClean="0"/>
-              <a:t>.</a:t>
-            </a:r>
-          </a:p>
-          <a:p>
-            <a:r>
-              <a:rPr lang="de-DE" sz="1100" dirty="0" smtClean="0"/>
-              <a:t>Dokumentiere </a:t>
-            </a:r>
-            <a:r>
-              <a:rPr lang="de-DE" sz="1100" dirty="0"/>
-              <a:t>jede Tomate und notiere auch Antworten auf folgende </a:t>
-            </a:r>
-            <a:r>
-              <a:rPr lang="de-DE" sz="1100" dirty="0" smtClean="0"/>
-              <a:t>Wahrnehmungsfragen:</a:t>
+              <a:t> und notiere auch Antworten auf folgende Wahrnehmungsfragen:</a:t>
             </a:r>
           </a:p>
           <a:p>
@@ -2149,10 +1992,9 @@
               <a:buChar char="§"/>
             </a:pPr>
             <a:r>
-              <a:rPr lang="de-DE" sz="1100" dirty="0" smtClean="0"/>
+              <a:rPr lang="de-DE" sz="1100" dirty="0"/>
               <a:t>Was tut mir gut?</a:t>
             </a:r>
-            <a:endParaRPr lang="de-DE" sz="1100" dirty="0"/>
           </a:p>
           <a:p>
             <a:pPr marL="539816" lvl="1" indent="-171450">
@@ -2160,20 +2002,8 @@
               <a:buChar char="§"/>
             </a:pPr>
             <a:r>
-              <a:rPr lang="de-DE" sz="1100" dirty="0" smtClean="0"/>
-              <a:t>Halte ich meine </a:t>
-            </a:r>
-            <a:r>
-              <a:rPr lang="de-DE" sz="1100" dirty="0" smtClean="0"/>
-              <a:t>Zeitfenster exakt</a:t>
-            </a:r>
-            <a:r>
-              <a:rPr lang="de-DE" sz="1100" dirty="0" smtClean="0"/>
-              <a:t> </a:t>
-            </a:r>
-            <a:r>
-              <a:rPr lang="de-DE" sz="1100" dirty="0" smtClean="0"/>
-              <a:t>ein? </a:t>
+              <a:rPr lang="de-DE" sz="1100" dirty="0"/>
+              <a:t>Halte ich meine Zeitfenster exakt ein? </a:t>
             </a:r>
           </a:p>
           <a:p>
@@ -2182,8 +2012,16 @@
               <a:buChar char="§"/>
             </a:pPr>
             <a:r>
-              <a:rPr lang="de-DE" sz="1100" dirty="0" smtClean="0"/>
-              <a:t>Reißt meine Konzentration während der Tomate ab? </a:t>
+              <a:rPr lang="de-DE" sz="1100" dirty="0"/>
+              <a:t>Reißt meine Konzentration während der </a:t>
+            </a:r>
+            <a:r>
+              <a:rPr lang="de-DE" sz="1100" dirty="0" err="1"/>
+              <a:t>Pomodoro</a:t>
+            </a:r>
+            <a:r>
+              <a:rPr lang="de-DE" sz="1100" dirty="0"/>
+              <a:t> ab? </a:t>
             </a:r>
           </a:p>
           <a:p>
@@ -2192,12 +2030,20 @@
               <a:buChar char="§"/>
             </a:pPr>
             <a:r>
-              <a:rPr lang="de-DE" sz="1100" dirty="0" smtClean="0"/>
-              <a:t>Bräuchte ich längere oder kürzere Tomaten? Warum? </a:t>
-            </a:r>
-          </a:p>
-          <a:p>
-            <a:endParaRPr lang="de-DE" sz="1200" dirty="0" smtClean="0"/>
+              <a:rPr lang="de-DE" sz="1100" dirty="0"/>
+              <a:t>Bräuchte ich längere oder kürzere </a:t>
+            </a:r>
+            <a:r>
+              <a:rPr lang="de-DE" sz="1100"/>
+              <a:t>Pomodoros? </a:t>
+            </a:r>
+            <a:r>
+              <a:rPr lang="de-DE" sz="1100" dirty="0"/>
+              <a:t>Warum? </a:t>
+            </a:r>
+          </a:p>
+          <a:p>
+            <a:endParaRPr lang="de-DE" sz="1200" dirty="0"/>
           </a:p>
           <a:p>
             <a:pPr marL="0" indent="0">

</xml_diff>

<commit_message>
TOM 13 für Promotion überarbeitet
</commit_message>
<xml_diff>
--- a/training-cards/music moves/Tomatoes (TOM)/ger/apprentice/ger_TOM_13_Spiele_mit_der_Zeit_MM_A.pptx
+++ b/training-cards/music moves/Tomatoes (TOM)/ger/apprentice/ger_TOM_13_Spiele_mit_der_Zeit_MM_A.pptx
@@ -724,7 +724,7 @@
           <a:p>
             <a:fld id="{FF5B2BAF-DF38-0A48-A798-0C06E514FD52}" type="datetimeFigureOut">
               <a:rPr lang="de-DE" smtClean="0"/>
-              <a:t>12.09.18</a:t>
+              <a:t>22.07.23</a:t>
             </a:fld>
             <a:endParaRPr lang="de-DE" dirty="0"/>
           </a:p>
@@ -937,7 +937,7 @@
           <a:p>
             <a:fld id="{FF5B2BAF-DF38-0A48-A798-0C06E514FD52}" type="datetimeFigureOut">
               <a:rPr lang="de-DE" smtClean="0"/>
-              <a:t>12.09.18</a:t>
+              <a:t>22.07.23</a:t>
             </a:fld>
             <a:endParaRPr lang="de-DE" dirty="0"/>
           </a:p>
@@ -1671,23 +1671,7 @@
             </a:pPr>
             <a:r>
               <a:rPr lang="de-DE" sz="1100" dirty="0"/>
-              <a:t>Francesco </a:t>
-            </a:r>
-            <a:r>
-              <a:rPr lang="de-DE" sz="1100" dirty="0" err="1"/>
-              <a:t>Cirillo</a:t>
-            </a:r>
-            <a:r>
-              <a:rPr lang="de-DE" sz="1100" dirty="0"/>
-              <a:t>, der Erfinder der </a:t>
-            </a:r>
-            <a:r>
-              <a:rPr lang="de-DE" sz="1100" dirty="0" err="1"/>
-              <a:t>Pomodoro</a:t>
-            </a:r>
-            <a:r>
-              <a:rPr lang="de-DE" sz="1100" dirty="0"/>
-              <a:t> Technik </a:t>
+              <a:t>Francesco Cirillo, der Erfinder der Pomodoro Technik </a:t>
             </a:r>
             <a:r>
               <a:rPr lang="de-DE" sz="1100" dirty="0" err="1"/>
@@ -1703,6 +1687,36 @@
             <a:r>
               <a:rPr lang="de-DE" sz="1100" dirty="0"/>
               <a:t>Einheiten von 20-40 Minuten.</a:t>
+            </a:r>
+          </a:p>
+          <a:p>
+            <a:pPr>
+              <a:lnSpc>
+                <a:spcPct val="120000"/>
+              </a:lnSpc>
+            </a:pPr>
+            <a:r>
+              <a:rPr lang="de-DE" sz="1100" dirty="0"/>
+              <a:t>Die Erfahrung zeigt, dass </a:t>
+            </a:r>
+            <a:r>
+              <a:rPr lang="de-DE" sz="1100"/>
+              <a:t>15 min- oder 5 min-Tomaten </a:t>
+            </a:r>
+            <a:r>
+              <a:rPr lang="de-DE" sz="1100" dirty="0"/>
+              <a:t>auch </a:t>
+            </a:r>
+            <a:r>
+              <a:rPr lang="de-DE" sz="1100"/>
+              <a:t>sehr </a:t>
+            </a:r>
+            <a:br>
+              <a:rPr lang="de-DE" sz="1100"/>
+            </a:br>
+            <a:r>
+              <a:rPr lang="de-DE" sz="1100"/>
+              <a:t>wirkungsvolle Zeitscheiben sein können.</a:t>
             </a:r>
             <a:endParaRPr lang="de-DE" dirty="0"/>
           </a:p>

</xml_diff>